<commit_message>
Fix the commiter ID
</commit_message>
<xml_diff>
--- a/OS-Neutron-OVS-Agent.pptx
+++ b/OS-Neutron-OVS-Agent.pptx
@@ -4287,11 +4287,15 @@
             </a:r>
             <a:r>
               <a:rPr lang="en-US" dirty="0" err="1" smtClean="0"/>
-              <a:t>Openvswitch</a:t>
+              <a:t>OpenVswitch</a:t>
             </a:r>
             <a:r>
               <a:rPr lang="en-US" dirty="0" smtClean="0"/>
-              <a:t> Agent</a:t>
+              <a:t> </a:t>
+            </a:r>
+            <a:r>
+              <a:rPr lang="en-US" dirty="0" smtClean="0"/>
+              <a:t>Agent</a:t>
             </a:r>
             <a:endParaRPr lang="en-US" dirty="0"/>
           </a:p>

</xml_diff>